<commit_message>
Edited International Team constructor. Edited documentation files.
</commit_message>
<xml_diff>
--- a/SAMS/trunk/project_documents/SAMS.pptx
+++ b/SAMS/trunk/project_documents/SAMS.pptx
@@ -10,6 +10,7 @@
     <p:sldId id="260" r:id="rId4"/>
     <p:sldId id="256" r:id="rId5"/>
     <p:sldId id="257" r:id="rId6"/>
+    <p:sldId id="261" r:id="rId7"/>
   </p:sldIdLst>
   <p:sldSz cx="7770813" cy="10056813"/>
   <p:notesSz cx="7770813" cy="10056813"/>
@@ -2645,22 +2646,199 @@
           <a:lstStyle/>
           <a:p>
             <a:r>
-              <a:rPr lang="en-US" dirty="0" smtClean="0"/>
-              <a:t>Manage Employees</a:t>
+              <a:rPr lang="en-US" dirty="0" smtClean="0">
+                <a:solidFill>
+                  <a:schemeClr val="tx1">
+                    <a:lumMod val="50000"/>
+                    <a:lumOff val="50000"/>
+                  </a:schemeClr>
+                </a:solidFill>
+              </a:rPr>
+              <a:t>Manage </a:t>
+            </a:r>
+            <a:r>
+              <a:rPr lang="en-US" dirty="0" smtClean="0">
+                <a:solidFill>
+                  <a:schemeClr val="tx1">
+                    <a:lumMod val="50000"/>
+                    <a:lumOff val="50000"/>
+                  </a:schemeClr>
+                </a:solidFill>
+              </a:rPr>
+              <a:t>Employees</a:t>
+            </a:r>
+          </a:p>
+          <a:p>
+            <a:pPr lvl="1"/>
+            <a:r>
+              <a:rPr lang="en-US" dirty="0" smtClean="0">
+                <a:solidFill>
+                  <a:schemeClr val="tx1">
+                    <a:lumMod val="50000"/>
+                    <a:lumOff val="50000"/>
+                  </a:schemeClr>
+                </a:solidFill>
+              </a:rPr>
+              <a:t>Add Full Time vs. Part Time</a:t>
+            </a:r>
+          </a:p>
+          <a:p>
+            <a:pPr lvl="1"/>
+            <a:r>
+              <a:rPr lang="en-US" dirty="0" smtClean="0">
+                <a:solidFill>
+                  <a:schemeClr val="tx1">
+                    <a:lumMod val="50000"/>
+                    <a:lumOff val="50000"/>
+                  </a:schemeClr>
+                </a:solidFill>
+              </a:rPr>
+              <a:t>Full Time Benefits</a:t>
+            </a:r>
+            <a:endParaRPr lang="en-US" dirty="0" smtClean="0">
+              <a:solidFill>
+                <a:schemeClr val="tx1">
+                  <a:lumMod val="50000"/>
+                  <a:lumOff val="50000"/>
+                </a:schemeClr>
+              </a:solidFill>
+            </a:endParaRPr>
+          </a:p>
+          <a:p>
+            <a:r>
+              <a:rPr lang="en-US" dirty="0" smtClean="0">
+                <a:solidFill>
+                  <a:schemeClr val="tx1">
+                    <a:lumMod val="50000"/>
+                    <a:lumOff val="50000"/>
+                  </a:schemeClr>
+                </a:solidFill>
+              </a:rPr>
+              <a:t>Manage </a:t>
+            </a:r>
+            <a:r>
+              <a:rPr lang="en-US" dirty="0" smtClean="0">
+                <a:solidFill>
+                  <a:schemeClr val="tx1">
+                    <a:lumMod val="50000"/>
+                    <a:lumOff val="50000"/>
+                  </a:schemeClr>
+                </a:solidFill>
+              </a:rPr>
+              <a:t>Teams</a:t>
+            </a:r>
+          </a:p>
+          <a:p>
+            <a:pPr lvl="1"/>
+            <a:r>
+              <a:rPr lang="en-US" dirty="0" smtClean="0">
+                <a:solidFill>
+                  <a:schemeClr val="tx1">
+                    <a:lumMod val="50000"/>
+                    <a:lumOff val="50000"/>
+                  </a:schemeClr>
+                </a:solidFill>
+              </a:rPr>
+              <a:t>Team must have Full Time employee</a:t>
+            </a:r>
+          </a:p>
+          <a:p>
+            <a:pPr lvl="1"/>
+            <a:r>
+              <a:rPr lang="en-US" dirty="0" smtClean="0">
+                <a:solidFill>
+                  <a:schemeClr val="tx1"/>
+                </a:solidFill>
+              </a:rPr>
+              <a:t>Internation</a:t>
+            </a:r>
+            <a:r>
+              <a:rPr lang="en-US" dirty="0" smtClean="0">
+                <a:solidFill>
+                  <a:schemeClr val="tx1"/>
+                </a:solidFill>
+              </a:rPr>
+              <a:t>al Team </a:t>
+            </a:r>
+            <a:r>
+              <a:rPr lang="en-US" dirty="0" err="1" smtClean="0">
+                <a:solidFill>
+                  <a:schemeClr val="tx1"/>
+                </a:solidFill>
+              </a:rPr>
+              <a:t>vs</a:t>
+            </a:r>
+            <a:r>
+              <a:rPr lang="en-US" dirty="0" smtClean="0">
+                <a:solidFill>
+                  <a:schemeClr val="tx1"/>
+                </a:solidFill>
+              </a:rPr>
+              <a:t> Domestic Team</a:t>
+            </a:r>
+          </a:p>
+          <a:p>
+            <a:pPr lvl="2"/>
+            <a:r>
+              <a:rPr lang="en-US" dirty="0" smtClean="0">
+                <a:solidFill>
+                  <a:schemeClr val="tx1"/>
+                </a:solidFill>
+              </a:rPr>
+              <a:t>International Team members have join dates</a:t>
+            </a:r>
+            <a:endParaRPr lang="en-US" dirty="0" smtClean="0">
+              <a:solidFill>
+                <a:schemeClr val="tx1"/>
+              </a:solidFill>
+            </a:endParaRPr>
+          </a:p>
+          <a:p>
+            <a:r>
+              <a:rPr lang="en-US" dirty="0" smtClean="0">
+                <a:solidFill>
+                  <a:schemeClr val="tx1">
+                    <a:lumMod val="50000"/>
+                    <a:lumOff val="50000"/>
+                  </a:schemeClr>
+                </a:solidFill>
+              </a:rPr>
+              <a:t>Manage </a:t>
+            </a:r>
+            <a:r>
+              <a:rPr lang="en-US" dirty="0" smtClean="0">
+                <a:solidFill>
+                  <a:schemeClr val="tx1">
+                    <a:lumMod val="50000"/>
+                    <a:lumOff val="50000"/>
+                  </a:schemeClr>
+                </a:solidFill>
+              </a:rPr>
+              <a:t>Programs</a:t>
             </a:r>
           </a:p>
           <a:p>
             <a:r>
-              <a:rPr lang="en-US" dirty="0" smtClean="0"/>
-              <a:t>Manage Teams</a:t>
+              <a:rPr lang="en-US" dirty="0" smtClean="0">
+                <a:solidFill>
+                  <a:schemeClr val="tx1">
+                    <a:lumMod val="50000"/>
+                    <a:lumOff val="50000"/>
+                  </a:schemeClr>
+                </a:solidFill>
+              </a:rPr>
+              <a:t>Manage Projects</a:t>
             </a:r>
           </a:p>
           <a:p>
-            <a:r>
-              <a:rPr lang="en-US" dirty="0" smtClean="0"/>
-              <a:t>Manage Programs</a:t>
-            </a:r>
-            <a:endParaRPr lang="en-US" dirty="0"/>
+            <a:endParaRPr lang="en-US" dirty="0">
+              <a:solidFill>
+                <a:schemeClr val="tx1">
+                  <a:lumMod val="50000"/>
+                  <a:lumOff val="50000"/>
+                </a:schemeClr>
+              </a:solidFill>
+            </a:endParaRPr>
           </a:p>
         </p:txBody>
       </p:sp>
@@ -2733,7 +2911,7 @@
               <a:noFill/>
             </a:ln>
             <a:extLst>
-              <a:ext uri="{91240B29-F687-4f45-9708-019B960494DF}">
+              <a:ext uri="{91240B29-F687-4F45-9708-019B960494DF}">
                 <a14:hiddenLine xmlns:a14="http://schemas.microsoft.com/office/drawing/2010/main" w="9525">
                   <a:solidFill>
                     <a:srgbClr val="000000"/>
@@ -2792,7 +2970,7 @@
                 <a:noFill/>
               </a:ln>
               <a:extLst>
-                <a:ext uri="{91240B29-F687-4f45-9708-019B960494DF}">
+                <a:ext uri="{91240B29-F687-4F45-9708-019B960494DF}">
                   <a14:hiddenLine xmlns:a14="http://schemas.microsoft.com/office/drawing/2010/main" w="9525">
                     <a:solidFill>
                       <a:srgbClr val="7D7D7D"/>
@@ -2937,14 +3115,14 @@
                   <a:noFill/>
                 </a:ln>
                 <a:extLst>
-                  <a:ext uri="{909E8E84-426E-40dd-AFC4-6F175D3DCCD1}">
+                  <a:ext uri="{909E8E84-426E-40DD-AFC4-6F175D3DCCD1}">
                     <a14:hiddenFill xmlns:a14="http://schemas.microsoft.com/office/drawing/2010/main">
                       <a:solidFill>
                         <a:srgbClr val="FFFFFF"/>
                       </a:solidFill>
                     </a14:hiddenFill>
                   </a:ext>
-                  <a:ext uri="{91240B29-F687-4f45-9708-019B960494DF}">
+                  <a:ext uri="{91240B29-F687-4F45-9708-019B960494DF}">
                     <a14:hiddenLine xmlns:a14="http://schemas.microsoft.com/office/drawing/2010/main" w="9525">
                       <a:solidFill>
                         <a:srgbClr val="000000"/>
@@ -3138,7 +3316,7 @@
                 <a:noFill/>
               </a:ln>
               <a:extLst>
-                <a:ext uri="{91240B29-F687-4f45-9708-019B960494DF}">
+                <a:ext uri="{91240B29-F687-4F45-9708-019B960494DF}">
                   <a14:hiddenLine xmlns:a14="http://schemas.microsoft.com/office/drawing/2010/main" w="9525">
                     <a:solidFill>
                       <a:srgbClr val="7D7D7D"/>
@@ -3283,14 +3461,14 @@
                   <a:noFill/>
                 </a:ln>
                 <a:extLst>
-                  <a:ext uri="{909E8E84-426E-40dd-AFC4-6F175D3DCCD1}">
+                  <a:ext uri="{909E8E84-426E-40DD-AFC4-6F175D3DCCD1}">
                     <a14:hiddenFill xmlns:a14="http://schemas.microsoft.com/office/drawing/2010/main">
                       <a:solidFill>
                         <a:srgbClr val="FFFFFF"/>
                       </a:solidFill>
                     </a14:hiddenFill>
                   </a:ext>
-                  <a:ext uri="{91240B29-F687-4f45-9708-019B960494DF}">
+                  <a:ext uri="{91240B29-F687-4F45-9708-019B960494DF}">
                     <a14:hiddenLine xmlns:a14="http://schemas.microsoft.com/office/drawing/2010/main" w="9525">
                       <a:solidFill>
                         <a:srgbClr val="000000"/>
@@ -3674,7 +3852,7 @@
                 <a:noFill/>
               </a:ln>
               <a:extLst>
-                <a:ext uri="{91240B29-F687-4f45-9708-019B960494DF}">
+                <a:ext uri="{91240B29-F687-4F45-9708-019B960494DF}">
                   <a14:hiddenLine xmlns:a14="http://schemas.microsoft.com/office/drawing/2010/main" w="9525">
                     <a:solidFill>
                       <a:srgbClr val="7D7D7D"/>
@@ -3829,14 +4007,14 @@
                   <a:noFill/>
                 </a:ln>
                 <a:extLst>
-                  <a:ext uri="{909E8E84-426E-40dd-AFC4-6F175D3DCCD1}">
+                  <a:ext uri="{909E8E84-426E-40DD-AFC4-6F175D3DCCD1}">
                     <a14:hiddenFill xmlns:a14="http://schemas.microsoft.com/office/drawing/2010/main">
                       <a:solidFill>
                         <a:srgbClr val="FFFFFF"/>
                       </a:solidFill>
                     </a14:hiddenFill>
                   </a:ext>
-                  <a:ext uri="{91240B29-F687-4f45-9708-019B960494DF}">
+                  <a:ext uri="{91240B29-F687-4F45-9708-019B960494DF}">
                     <a14:hiddenLine xmlns:a14="http://schemas.microsoft.com/office/drawing/2010/main" w="9525">
                       <a:solidFill>
                         <a:srgbClr val="000000"/>
@@ -4012,7 +4190,7 @@
               <a:noFill/>
             </a:ln>
             <a:extLst>
-              <a:ext uri="{91240B29-F687-4f45-9708-019B960494DF}">
+              <a:ext uri="{91240B29-F687-4F45-9708-019B960494DF}">
                 <a14:hiddenLine xmlns:a14="http://schemas.microsoft.com/office/drawing/2010/main" w="9525">
                   <a:solidFill>
                     <a:srgbClr val="000000"/>
@@ -4071,7 +4249,7 @@
                 <a:noFill/>
               </a:ln>
               <a:extLst>
-                <a:ext uri="{91240B29-F687-4f45-9708-019B960494DF}">
+                <a:ext uri="{91240B29-F687-4F45-9708-019B960494DF}">
                   <a14:hiddenLine xmlns:a14="http://schemas.microsoft.com/office/drawing/2010/main" w="9525">
                     <a:solidFill>
                       <a:srgbClr val="7D7D7D"/>
@@ -4216,14 +4394,14 @@
                   <a:noFill/>
                 </a:ln>
                 <a:extLst>
-                  <a:ext uri="{909E8E84-426E-40dd-AFC4-6F175D3DCCD1}">
+                  <a:ext uri="{909E8E84-426E-40DD-AFC4-6F175D3DCCD1}">
                     <a14:hiddenFill xmlns:a14="http://schemas.microsoft.com/office/drawing/2010/main">
                       <a:solidFill>
                         <a:srgbClr val="FFFFFF"/>
                       </a:solidFill>
                     </a14:hiddenFill>
                   </a:ext>
-                  <a:ext uri="{91240B29-F687-4f45-9708-019B960494DF}">
+                  <a:ext uri="{91240B29-F687-4F45-9708-019B960494DF}">
                     <a14:hiddenLine xmlns:a14="http://schemas.microsoft.com/office/drawing/2010/main" w="9525">
                       <a:solidFill>
                         <a:srgbClr val="000000"/>
@@ -4397,7 +4575,7 @@
                 <a:noFill/>
               </a:ln>
               <a:extLst>
-                <a:ext uri="{91240B29-F687-4f45-9708-019B960494DF}">
+                <a:ext uri="{91240B29-F687-4F45-9708-019B960494DF}">
                   <a14:hiddenLine xmlns:a14="http://schemas.microsoft.com/office/drawing/2010/main" w="9525">
                     <a:solidFill>
                       <a:srgbClr val="7D7D7D"/>
@@ -4542,14 +4720,14 @@
                   <a:noFill/>
                 </a:ln>
                 <a:extLst>
-                  <a:ext uri="{909E8E84-426E-40dd-AFC4-6F175D3DCCD1}">
+                  <a:ext uri="{909E8E84-426E-40DD-AFC4-6F175D3DCCD1}">
                     <a14:hiddenFill xmlns:a14="http://schemas.microsoft.com/office/drawing/2010/main">
                       <a:solidFill>
                         <a:srgbClr val="FFFFFF"/>
                       </a:solidFill>
                     </a14:hiddenFill>
                   </a:ext>
-                  <a:ext uri="{91240B29-F687-4f45-9708-019B960494DF}">
+                  <a:ext uri="{91240B29-F687-4F45-9708-019B960494DF}">
                     <a14:hiddenLine xmlns:a14="http://schemas.microsoft.com/office/drawing/2010/main" w="9525">
                       <a:solidFill>
                         <a:srgbClr val="000000"/>
@@ -4833,7 +5011,7 @@
                 <a:noFill/>
               </a:ln>
               <a:extLst>
-                <a:ext uri="{91240B29-F687-4f45-9708-019B960494DF}">
+                <a:ext uri="{91240B29-F687-4F45-9708-019B960494DF}">
                   <a14:hiddenLine xmlns:a14="http://schemas.microsoft.com/office/drawing/2010/main" w="9525">
                     <a:solidFill>
                       <a:srgbClr val="7D7D7D"/>
@@ -4988,14 +5166,14 @@
                   <a:noFill/>
                 </a:ln>
                 <a:extLst>
-                  <a:ext uri="{909E8E84-426E-40dd-AFC4-6F175D3DCCD1}">
+                  <a:ext uri="{909E8E84-426E-40DD-AFC4-6F175D3DCCD1}">
                     <a14:hiddenFill xmlns:a14="http://schemas.microsoft.com/office/drawing/2010/main">
                       <a:solidFill>
                         <a:srgbClr val="FFFFFF"/>
                       </a:solidFill>
                     </a14:hiddenFill>
                   </a:ext>
-                  <a:ext uri="{91240B29-F687-4f45-9708-019B960494DF}">
+                  <a:ext uri="{91240B29-F687-4F45-9708-019B960494DF}">
                     <a14:hiddenLine xmlns:a14="http://schemas.microsoft.com/office/drawing/2010/main" w="9525">
                       <a:solidFill>
                         <a:srgbClr val="000000"/>
@@ -5171,7 +5349,7 @@
               <a:noFill/>
             </a:ln>
             <a:extLst>
-              <a:ext uri="{91240B29-F687-4f45-9708-019B960494DF}">
+              <a:ext uri="{91240B29-F687-4F45-9708-019B960494DF}">
                 <a14:hiddenLine xmlns:a14="http://schemas.microsoft.com/office/drawing/2010/main" w="9525">
                   <a:solidFill>
                     <a:srgbClr val="000000"/>
@@ -5230,7 +5408,7 @@
                 <a:noFill/>
               </a:ln>
               <a:extLst>
-                <a:ext uri="{91240B29-F687-4f45-9708-019B960494DF}">
+                <a:ext uri="{91240B29-F687-4F45-9708-019B960494DF}">
                   <a14:hiddenLine xmlns:a14="http://schemas.microsoft.com/office/drawing/2010/main" w="9525">
                     <a:solidFill>
                       <a:srgbClr val="7D7D7D"/>
@@ -5375,14 +5553,14 @@
                   <a:noFill/>
                 </a:ln>
                 <a:extLst>
-                  <a:ext uri="{909E8E84-426E-40dd-AFC4-6F175D3DCCD1}">
+                  <a:ext uri="{909E8E84-426E-40DD-AFC4-6F175D3DCCD1}">
                     <a14:hiddenFill xmlns:a14="http://schemas.microsoft.com/office/drawing/2010/main">
                       <a:solidFill>
                         <a:srgbClr val="FFFFFF"/>
                       </a:solidFill>
                     </a14:hiddenFill>
                   </a:ext>
-                  <a:ext uri="{91240B29-F687-4f45-9708-019B960494DF}">
+                  <a:ext uri="{91240B29-F687-4F45-9708-019B960494DF}">
                     <a14:hiddenLine xmlns:a14="http://schemas.microsoft.com/office/drawing/2010/main" w="9525">
                       <a:solidFill>
                         <a:srgbClr val="000000"/>
@@ -5616,7 +5794,7 @@
                 <a:noFill/>
               </a:ln>
               <a:extLst>
-                <a:ext uri="{91240B29-F687-4f45-9708-019B960494DF}">
+                <a:ext uri="{91240B29-F687-4F45-9708-019B960494DF}">
                   <a14:hiddenLine xmlns:a14="http://schemas.microsoft.com/office/drawing/2010/main" w="9525">
                     <a:solidFill>
                       <a:srgbClr val="7D7D7D"/>
@@ -5761,14 +5939,14 @@
                   <a:noFill/>
                 </a:ln>
                 <a:extLst>
-                  <a:ext uri="{909E8E84-426E-40dd-AFC4-6F175D3DCCD1}">
+                  <a:ext uri="{909E8E84-426E-40DD-AFC4-6F175D3DCCD1}">
                     <a14:hiddenFill xmlns:a14="http://schemas.microsoft.com/office/drawing/2010/main">
                       <a:solidFill>
                         <a:srgbClr val="FFFFFF"/>
                       </a:solidFill>
                     </a14:hiddenFill>
                   </a:ext>
-                  <a:ext uri="{91240B29-F687-4f45-9708-019B960494DF}">
+                  <a:ext uri="{91240B29-F687-4F45-9708-019B960494DF}">
                     <a14:hiddenLine xmlns:a14="http://schemas.microsoft.com/office/drawing/2010/main" w="9525">
                       <a:solidFill>
                         <a:srgbClr val="000000"/>
@@ -6142,7 +6320,7 @@
                 <a:noFill/>
               </a:ln>
               <a:extLst>
-                <a:ext uri="{91240B29-F687-4f45-9708-019B960494DF}">
+                <a:ext uri="{91240B29-F687-4F45-9708-019B960494DF}">
                   <a14:hiddenLine xmlns:a14="http://schemas.microsoft.com/office/drawing/2010/main" w="9525">
                     <a:solidFill>
                       <a:srgbClr val="7D7D7D"/>
@@ -6297,14 +6475,14 @@
                   <a:noFill/>
                 </a:ln>
                 <a:extLst>
-                  <a:ext uri="{909E8E84-426E-40dd-AFC4-6F175D3DCCD1}">
+                  <a:ext uri="{909E8E84-426E-40DD-AFC4-6F175D3DCCD1}">
                     <a14:hiddenFill xmlns:a14="http://schemas.microsoft.com/office/drawing/2010/main">
                       <a:solidFill>
                         <a:srgbClr val="FFFFFF"/>
                       </a:solidFill>
                     </a14:hiddenFill>
                   </a:ext>
-                  <a:ext uri="{91240B29-F687-4f45-9708-019B960494DF}">
+                  <a:ext uri="{91240B29-F687-4F45-9708-019B960494DF}">
                     <a14:hiddenLine xmlns:a14="http://schemas.microsoft.com/office/drawing/2010/main" w="9525">
                       <a:solidFill>
                         <a:srgbClr val="000000"/>
@@ -6507,7 +6685,7 @@
               <a:tailEnd type="none" w="sm" len="sm"/>
             </a:ln>
             <a:extLst>
-              <a:ext uri="{909E8E84-426E-40dd-AFC4-6F175D3DCCD1}">
+              <a:ext uri="{909E8E84-426E-40DD-AFC4-6F175D3DCCD1}">
                 <a14:hiddenFill xmlns:a14="http://schemas.microsoft.com/office/drawing/2010/main">
                   <a:solidFill>
                     <a:srgbClr val="FFFFFF"/>
@@ -6545,14 +6723,14 @@
               <a:noFill/>
             </a:ln>
             <a:extLst>
-              <a:ext uri="{909E8E84-426E-40dd-AFC4-6F175D3DCCD1}">
+              <a:ext uri="{909E8E84-426E-40DD-AFC4-6F175D3DCCD1}">
                 <a14:hiddenFill xmlns:a14="http://schemas.microsoft.com/office/drawing/2010/main">
                   <a:solidFill>
                     <a:srgbClr val="FFFFFF"/>
                   </a:solidFill>
                 </a14:hiddenFill>
               </a:ext>
-              <a:ext uri="{91240B29-F687-4f45-9708-019B960494DF}">
+              <a:ext uri="{91240B29-F687-4F45-9708-019B960494DF}">
                 <a14:hiddenLine xmlns:a14="http://schemas.microsoft.com/office/drawing/2010/main" w="9525">
                   <a:solidFill>
                     <a:srgbClr val="555555"/>
@@ -6601,14 +6779,14 @@
               <a:noFill/>
             </a:ln>
             <a:extLst>
-              <a:ext uri="{909E8E84-426E-40dd-AFC4-6F175D3DCCD1}">
+              <a:ext uri="{909E8E84-426E-40DD-AFC4-6F175D3DCCD1}">
                 <a14:hiddenFill xmlns:a14="http://schemas.microsoft.com/office/drawing/2010/main">
                   <a:solidFill>
                     <a:srgbClr val="FFFFFF"/>
                   </a:solidFill>
                 </a14:hiddenFill>
               </a:ext>
-              <a:ext uri="{91240B29-F687-4f45-9708-019B960494DF}">
+              <a:ext uri="{91240B29-F687-4F45-9708-019B960494DF}">
                 <a14:hiddenLine xmlns:a14="http://schemas.microsoft.com/office/drawing/2010/main" w="9525">
                   <a:solidFill>
                     <a:srgbClr val="555555"/>
@@ -6657,14 +6835,14 @@
               <a:noFill/>
             </a:ln>
             <a:extLst>
-              <a:ext uri="{909E8E84-426E-40dd-AFC4-6F175D3DCCD1}">
+              <a:ext uri="{909E8E84-426E-40DD-AFC4-6F175D3DCCD1}">
                 <a14:hiddenFill xmlns:a14="http://schemas.microsoft.com/office/drawing/2010/main">
                   <a:solidFill>
                     <a:srgbClr val="FFFFFF"/>
                   </a:solidFill>
                 </a14:hiddenFill>
               </a:ext>
-              <a:ext uri="{91240B29-F687-4f45-9708-019B960494DF}">
+              <a:ext uri="{91240B29-F687-4F45-9708-019B960494DF}">
                 <a14:hiddenLine xmlns:a14="http://schemas.microsoft.com/office/drawing/2010/main" w="9525">
                   <a:solidFill>
                     <a:srgbClr val="000000"/>
@@ -6865,7 +7043,7 @@
               <a:tailEnd type="none" w="sm" len="sm"/>
             </a:ln>
             <a:extLst>
-              <a:ext uri="{909E8E84-426E-40dd-AFC4-6F175D3DCCD1}">
+              <a:ext uri="{909E8E84-426E-40DD-AFC4-6F175D3DCCD1}">
                 <a14:hiddenFill xmlns:a14="http://schemas.microsoft.com/office/drawing/2010/main">
                   <a:solidFill>
                     <a:srgbClr val="FFFFFF"/>
@@ -6903,14 +7081,14 @@
               <a:noFill/>
             </a:ln>
             <a:extLst>
-              <a:ext uri="{909E8E84-426E-40dd-AFC4-6F175D3DCCD1}">
+              <a:ext uri="{909E8E84-426E-40DD-AFC4-6F175D3DCCD1}">
                 <a14:hiddenFill xmlns:a14="http://schemas.microsoft.com/office/drawing/2010/main">
                   <a:solidFill>
                     <a:srgbClr val="FFFFFF"/>
                   </a:solidFill>
                 </a14:hiddenFill>
               </a:ext>
-              <a:ext uri="{91240B29-F687-4f45-9708-019B960494DF}">
+              <a:ext uri="{91240B29-F687-4F45-9708-019B960494DF}">
                 <a14:hiddenLine xmlns:a14="http://schemas.microsoft.com/office/drawing/2010/main" w="9525">
                   <a:solidFill>
                     <a:srgbClr val="555555"/>
@@ -6959,14 +7137,14 @@
               <a:noFill/>
             </a:ln>
             <a:extLst>
-              <a:ext uri="{909E8E84-426E-40dd-AFC4-6F175D3DCCD1}">
+              <a:ext uri="{909E8E84-426E-40DD-AFC4-6F175D3DCCD1}">
                 <a14:hiddenFill xmlns:a14="http://schemas.microsoft.com/office/drawing/2010/main">
                   <a:solidFill>
                     <a:srgbClr val="FFFFFF"/>
                   </a:solidFill>
                 </a14:hiddenFill>
               </a:ext>
-              <a:ext uri="{91240B29-F687-4f45-9708-019B960494DF}">
+              <a:ext uri="{91240B29-F687-4F45-9708-019B960494DF}">
                 <a14:hiddenLine xmlns:a14="http://schemas.microsoft.com/office/drawing/2010/main" w="9525">
                   <a:solidFill>
                     <a:srgbClr val="555555"/>
@@ -7015,14 +7193,14 @@
               <a:noFill/>
             </a:ln>
             <a:extLst>
-              <a:ext uri="{909E8E84-426E-40dd-AFC4-6F175D3DCCD1}">
+              <a:ext uri="{909E8E84-426E-40DD-AFC4-6F175D3DCCD1}">
                 <a14:hiddenFill xmlns:a14="http://schemas.microsoft.com/office/drawing/2010/main">
                   <a:solidFill>
                     <a:srgbClr val="FFFFFF"/>
                   </a:solidFill>
                 </a14:hiddenFill>
               </a:ext>
-              <a:ext uri="{91240B29-F687-4f45-9708-019B960494DF}">
+              <a:ext uri="{91240B29-F687-4F45-9708-019B960494DF}">
                 <a14:hiddenLine xmlns:a14="http://schemas.microsoft.com/office/drawing/2010/main" w="9525">
                   <a:solidFill>
                     <a:srgbClr val="000000"/>
@@ -7196,7 +7374,7 @@
               <a:noFill/>
             </a:ln>
             <a:extLst>
-              <a:ext uri="{91240B29-F687-4f45-9708-019B960494DF}">
+              <a:ext uri="{91240B29-F687-4F45-9708-019B960494DF}">
                 <a14:hiddenLine xmlns:a14="http://schemas.microsoft.com/office/drawing/2010/main" w="9525">
                   <a:solidFill>
                     <a:srgbClr val="000000"/>
@@ -7255,7 +7433,7 @@
                 <a:noFill/>
               </a:ln>
               <a:extLst>
-                <a:ext uri="{91240B29-F687-4f45-9708-019B960494DF}">
+                <a:ext uri="{91240B29-F687-4F45-9708-019B960494DF}">
                   <a14:hiddenLine xmlns:a14="http://schemas.microsoft.com/office/drawing/2010/main" w="9525">
                     <a:solidFill>
                       <a:srgbClr val="7D7D7D"/>
@@ -7400,14 +7578,14 @@
                   <a:noFill/>
                 </a:ln>
                 <a:extLst>
-                  <a:ext uri="{909E8E84-426E-40dd-AFC4-6F175D3DCCD1}">
+                  <a:ext uri="{909E8E84-426E-40DD-AFC4-6F175D3DCCD1}">
                     <a14:hiddenFill xmlns:a14="http://schemas.microsoft.com/office/drawing/2010/main">
                       <a:solidFill>
                         <a:srgbClr val="FFFFFF"/>
                       </a:solidFill>
                     </a14:hiddenFill>
                   </a:ext>
-                  <a:ext uri="{91240B29-F687-4f45-9708-019B960494DF}">
+                  <a:ext uri="{91240B29-F687-4F45-9708-019B960494DF}">
                     <a14:hiddenLine xmlns:a14="http://schemas.microsoft.com/office/drawing/2010/main" w="9525">
                       <a:solidFill>
                         <a:srgbClr val="000000"/>
@@ -7581,7 +7759,7 @@
                 <a:noFill/>
               </a:ln>
               <a:extLst>
-                <a:ext uri="{91240B29-F687-4f45-9708-019B960494DF}">
+                <a:ext uri="{91240B29-F687-4F45-9708-019B960494DF}">
                   <a14:hiddenLine xmlns:a14="http://schemas.microsoft.com/office/drawing/2010/main" w="9525">
                     <a:solidFill>
                       <a:srgbClr val="7D7D7D"/>
@@ -7726,14 +7904,14 @@
                   <a:noFill/>
                 </a:ln>
                 <a:extLst>
-                  <a:ext uri="{909E8E84-426E-40dd-AFC4-6F175D3DCCD1}">
+                  <a:ext uri="{909E8E84-426E-40DD-AFC4-6F175D3DCCD1}">
                     <a14:hiddenFill xmlns:a14="http://schemas.microsoft.com/office/drawing/2010/main">
                       <a:solidFill>
                         <a:srgbClr val="FFFFFF"/>
                       </a:solidFill>
                     </a14:hiddenFill>
                   </a:ext>
-                  <a:ext uri="{91240B29-F687-4f45-9708-019B960494DF}">
+                  <a:ext uri="{91240B29-F687-4F45-9708-019B960494DF}">
                     <a14:hiddenLine xmlns:a14="http://schemas.microsoft.com/office/drawing/2010/main" w="9525">
                       <a:solidFill>
                         <a:srgbClr val="000000"/>
@@ -7977,7 +8155,7 @@
                 <a:noFill/>
               </a:ln>
               <a:extLst>
-                <a:ext uri="{91240B29-F687-4f45-9708-019B960494DF}">
+                <a:ext uri="{91240B29-F687-4F45-9708-019B960494DF}">
                   <a14:hiddenLine xmlns:a14="http://schemas.microsoft.com/office/drawing/2010/main" w="9525">
                     <a:solidFill>
                       <a:srgbClr val="7D7D7D"/>
@@ -8132,14 +8310,14 @@
                   <a:noFill/>
                 </a:ln>
                 <a:extLst>
-                  <a:ext uri="{909E8E84-426E-40dd-AFC4-6F175D3DCCD1}">
+                  <a:ext uri="{909E8E84-426E-40DD-AFC4-6F175D3DCCD1}">
                     <a14:hiddenFill xmlns:a14="http://schemas.microsoft.com/office/drawing/2010/main">
                       <a:solidFill>
                         <a:srgbClr val="FFFFFF"/>
                       </a:solidFill>
                     </a14:hiddenFill>
                   </a:ext>
-                  <a:ext uri="{91240B29-F687-4f45-9708-019B960494DF}">
+                  <a:ext uri="{91240B29-F687-4F45-9708-019B960494DF}">
                     <a14:hiddenLine xmlns:a14="http://schemas.microsoft.com/office/drawing/2010/main" w="9525">
                       <a:solidFill>
                         <a:srgbClr val="000000"/>
@@ -8315,7 +8493,7 @@
               <a:noFill/>
             </a:ln>
             <a:extLst>
-              <a:ext uri="{91240B29-F687-4f45-9708-019B960494DF}">
+              <a:ext uri="{91240B29-F687-4F45-9708-019B960494DF}">
                 <a14:hiddenLine xmlns:a14="http://schemas.microsoft.com/office/drawing/2010/main" w="9525">
                   <a:solidFill>
                     <a:srgbClr val="000000"/>
@@ -8374,7 +8552,7 @@
                 <a:noFill/>
               </a:ln>
               <a:extLst>
-                <a:ext uri="{91240B29-F687-4f45-9708-019B960494DF}">
+                <a:ext uri="{91240B29-F687-4F45-9708-019B960494DF}">
                   <a14:hiddenLine xmlns:a14="http://schemas.microsoft.com/office/drawing/2010/main" w="9525">
                     <a:solidFill>
                       <a:srgbClr val="7D7D7D"/>
@@ -8519,14 +8697,14 @@
                   <a:noFill/>
                 </a:ln>
                 <a:extLst>
-                  <a:ext uri="{909E8E84-426E-40dd-AFC4-6F175D3DCCD1}">
+                  <a:ext uri="{909E8E84-426E-40DD-AFC4-6F175D3DCCD1}">
                     <a14:hiddenFill xmlns:a14="http://schemas.microsoft.com/office/drawing/2010/main">
                       <a:solidFill>
                         <a:srgbClr val="FFFFFF"/>
                       </a:solidFill>
                     </a14:hiddenFill>
                   </a:ext>
-                  <a:ext uri="{91240B29-F687-4f45-9708-019B960494DF}">
+                  <a:ext uri="{91240B29-F687-4F45-9708-019B960494DF}">
                     <a14:hiddenLine xmlns:a14="http://schemas.microsoft.com/office/drawing/2010/main" w="9525">
                       <a:solidFill>
                         <a:srgbClr val="000000"/>
@@ -8730,7 +8908,7 @@
                 <a:noFill/>
               </a:ln>
               <a:extLst>
-                <a:ext uri="{91240B29-F687-4f45-9708-019B960494DF}">
+                <a:ext uri="{91240B29-F687-4F45-9708-019B960494DF}">
                   <a14:hiddenLine xmlns:a14="http://schemas.microsoft.com/office/drawing/2010/main" w="9525">
                     <a:solidFill>
                       <a:srgbClr val="7D7D7D"/>
@@ -8875,14 +9053,14 @@
                   <a:noFill/>
                 </a:ln>
                 <a:extLst>
-                  <a:ext uri="{909E8E84-426E-40dd-AFC4-6F175D3DCCD1}">
+                  <a:ext uri="{909E8E84-426E-40DD-AFC4-6F175D3DCCD1}">
                     <a14:hiddenFill xmlns:a14="http://schemas.microsoft.com/office/drawing/2010/main">
                       <a:solidFill>
                         <a:srgbClr val="FFFFFF"/>
                       </a:solidFill>
                     </a14:hiddenFill>
                   </a:ext>
-                  <a:ext uri="{91240B29-F687-4f45-9708-019B960494DF}">
+                  <a:ext uri="{91240B29-F687-4F45-9708-019B960494DF}">
                     <a14:hiddenLine xmlns:a14="http://schemas.microsoft.com/office/drawing/2010/main" w="9525">
                       <a:solidFill>
                         <a:srgbClr val="000000"/>
@@ -9216,7 +9394,7 @@
                 <a:noFill/>
               </a:ln>
               <a:extLst>
-                <a:ext uri="{91240B29-F687-4f45-9708-019B960494DF}">
+                <a:ext uri="{91240B29-F687-4F45-9708-019B960494DF}">
                   <a14:hiddenLine xmlns:a14="http://schemas.microsoft.com/office/drawing/2010/main" w="9525">
                     <a:solidFill>
                       <a:srgbClr val="7D7D7D"/>
@@ -9371,14 +9549,14 @@
                   <a:noFill/>
                 </a:ln>
                 <a:extLst>
-                  <a:ext uri="{909E8E84-426E-40dd-AFC4-6F175D3DCCD1}">
+                  <a:ext uri="{909E8E84-426E-40DD-AFC4-6F175D3DCCD1}">
                     <a14:hiddenFill xmlns:a14="http://schemas.microsoft.com/office/drawing/2010/main">
                       <a:solidFill>
                         <a:srgbClr val="FFFFFF"/>
                       </a:solidFill>
                     </a14:hiddenFill>
                   </a:ext>
-                  <a:ext uri="{91240B29-F687-4f45-9708-019B960494DF}">
+                  <a:ext uri="{91240B29-F687-4F45-9708-019B960494DF}">
                     <a14:hiddenLine xmlns:a14="http://schemas.microsoft.com/office/drawing/2010/main" w="9525">
                       <a:solidFill>
                         <a:srgbClr val="000000"/>
@@ -9581,7 +9759,7 @@
               <a:tailEnd type="none" w="sm" len="sm"/>
             </a:ln>
             <a:extLst>
-              <a:ext uri="{909E8E84-426E-40dd-AFC4-6F175D3DCCD1}">
+              <a:ext uri="{909E8E84-426E-40DD-AFC4-6F175D3DCCD1}">
                 <a14:hiddenFill xmlns:a14="http://schemas.microsoft.com/office/drawing/2010/main">
                   <a:solidFill>
                     <a:srgbClr val="FFFFFF"/>
@@ -9619,14 +9797,14 @@
               <a:noFill/>
             </a:ln>
             <a:extLst>
-              <a:ext uri="{909E8E84-426E-40dd-AFC4-6F175D3DCCD1}">
+              <a:ext uri="{909E8E84-426E-40DD-AFC4-6F175D3DCCD1}">
                 <a14:hiddenFill xmlns:a14="http://schemas.microsoft.com/office/drawing/2010/main">
                   <a:solidFill>
                     <a:srgbClr val="FFFFFF"/>
                   </a:solidFill>
                 </a14:hiddenFill>
               </a:ext>
-              <a:ext uri="{91240B29-F687-4f45-9708-019B960494DF}">
+              <a:ext uri="{91240B29-F687-4F45-9708-019B960494DF}">
                 <a14:hiddenLine xmlns:a14="http://schemas.microsoft.com/office/drawing/2010/main" w="9525">
                   <a:solidFill>
                     <a:srgbClr val="555555"/>
@@ -9675,14 +9853,14 @@
               <a:noFill/>
             </a:ln>
             <a:extLst>
-              <a:ext uri="{909E8E84-426E-40dd-AFC4-6F175D3DCCD1}">
+              <a:ext uri="{909E8E84-426E-40DD-AFC4-6F175D3DCCD1}">
                 <a14:hiddenFill xmlns:a14="http://schemas.microsoft.com/office/drawing/2010/main">
                   <a:solidFill>
                     <a:srgbClr val="FFFFFF"/>
                   </a:solidFill>
                 </a14:hiddenFill>
               </a:ext>
-              <a:ext uri="{91240B29-F687-4f45-9708-019B960494DF}">
+              <a:ext uri="{91240B29-F687-4F45-9708-019B960494DF}">
                 <a14:hiddenLine xmlns:a14="http://schemas.microsoft.com/office/drawing/2010/main" w="9525">
                   <a:solidFill>
                     <a:srgbClr val="555555"/>
@@ -9731,14 +9909,14 @@
               <a:noFill/>
             </a:ln>
             <a:extLst>
-              <a:ext uri="{909E8E84-426E-40dd-AFC4-6F175D3DCCD1}">
+              <a:ext uri="{909E8E84-426E-40DD-AFC4-6F175D3DCCD1}">
                 <a14:hiddenFill xmlns:a14="http://schemas.microsoft.com/office/drawing/2010/main">
                   <a:solidFill>
                     <a:srgbClr val="FFFFFF"/>
                   </a:solidFill>
                 </a14:hiddenFill>
               </a:ext>
-              <a:ext uri="{91240B29-F687-4f45-9708-019B960494DF}">
+              <a:ext uri="{91240B29-F687-4F45-9708-019B960494DF}">
                 <a14:hiddenLine xmlns:a14="http://schemas.microsoft.com/office/drawing/2010/main" w="9525">
                   <a:solidFill>
                     <a:srgbClr val="000000"/>
@@ -9939,7 +10117,7 @@
               <a:tailEnd type="none" w="sm" len="sm"/>
             </a:ln>
             <a:extLst>
-              <a:ext uri="{909E8E84-426E-40dd-AFC4-6F175D3DCCD1}">
+              <a:ext uri="{909E8E84-426E-40DD-AFC4-6F175D3DCCD1}">
                 <a14:hiddenFill xmlns:a14="http://schemas.microsoft.com/office/drawing/2010/main">
                   <a:solidFill>
                     <a:srgbClr val="FFFFFF"/>
@@ -9977,14 +10155,14 @@
               <a:noFill/>
             </a:ln>
             <a:extLst>
-              <a:ext uri="{909E8E84-426E-40dd-AFC4-6F175D3DCCD1}">
+              <a:ext uri="{909E8E84-426E-40DD-AFC4-6F175D3DCCD1}">
                 <a14:hiddenFill xmlns:a14="http://schemas.microsoft.com/office/drawing/2010/main">
                   <a:solidFill>
                     <a:srgbClr val="FFFFFF"/>
                   </a:solidFill>
                 </a14:hiddenFill>
               </a:ext>
-              <a:ext uri="{91240B29-F687-4f45-9708-019B960494DF}">
+              <a:ext uri="{91240B29-F687-4F45-9708-019B960494DF}">
                 <a14:hiddenLine xmlns:a14="http://schemas.microsoft.com/office/drawing/2010/main" w="9525">
                   <a:solidFill>
                     <a:srgbClr val="555555"/>
@@ -10033,14 +10211,14 @@
               <a:noFill/>
             </a:ln>
             <a:extLst>
-              <a:ext uri="{909E8E84-426E-40dd-AFC4-6F175D3DCCD1}">
+              <a:ext uri="{909E8E84-426E-40DD-AFC4-6F175D3DCCD1}">
                 <a14:hiddenFill xmlns:a14="http://schemas.microsoft.com/office/drawing/2010/main">
                   <a:solidFill>
                     <a:srgbClr val="FFFFFF"/>
                   </a:solidFill>
                 </a14:hiddenFill>
               </a:ext>
-              <a:ext uri="{91240B29-F687-4f45-9708-019B960494DF}">
+              <a:ext uri="{91240B29-F687-4F45-9708-019B960494DF}">
                 <a14:hiddenLine xmlns:a14="http://schemas.microsoft.com/office/drawing/2010/main" w="9525">
                   <a:solidFill>
                     <a:srgbClr val="555555"/>
@@ -10089,14 +10267,14 @@
               <a:noFill/>
             </a:ln>
             <a:extLst>
-              <a:ext uri="{909E8E84-426E-40dd-AFC4-6F175D3DCCD1}">
+              <a:ext uri="{909E8E84-426E-40DD-AFC4-6F175D3DCCD1}">
                 <a14:hiddenFill xmlns:a14="http://schemas.microsoft.com/office/drawing/2010/main">
                   <a:solidFill>
                     <a:srgbClr val="FFFFFF"/>
                   </a:solidFill>
                 </a14:hiddenFill>
               </a:ext>
-              <a:ext uri="{91240B29-F687-4f45-9708-019B960494DF}">
+              <a:ext uri="{91240B29-F687-4F45-9708-019B960494DF}">
                 <a14:hiddenLine xmlns:a14="http://schemas.microsoft.com/office/drawing/2010/main" w="9525">
                   <a:solidFill>
                     <a:srgbClr val="000000"/>
@@ -10297,7 +10475,7 @@
               <a:tailEnd type="none" w="sm" len="sm"/>
             </a:ln>
             <a:extLst>
-              <a:ext uri="{909E8E84-426E-40dd-AFC4-6F175D3DCCD1}">
+              <a:ext uri="{909E8E84-426E-40DD-AFC4-6F175D3DCCD1}">
                 <a14:hiddenFill xmlns:a14="http://schemas.microsoft.com/office/drawing/2010/main">
                   <a:solidFill>
                     <a:srgbClr val="FFFFFF"/>
@@ -10335,14 +10513,14 @@
               <a:noFill/>
             </a:ln>
             <a:extLst>
-              <a:ext uri="{909E8E84-426E-40dd-AFC4-6F175D3DCCD1}">
+              <a:ext uri="{909E8E84-426E-40DD-AFC4-6F175D3DCCD1}">
                 <a14:hiddenFill xmlns:a14="http://schemas.microsoft.com/office/drawing/2010/main">
                   <a:solidFill>
                     <a:srgbClr val="FFFFFF"/>
                   </a:solidFill>
                 </a14:hiddenFill>
               </a:ext>
-              <a:ext uri="{91240B29-F687-4f45-9708-019B960494DF}">
+              <a:ext uri="{91240B29-F687-4F45-9708-019B960494DF}">
                 <a14:hiddenLine xmlns:a14="http://schemas.microsoft.com/office/drawing/2010/main" w="9525">
                   <a:solidFill>
                     <a:srgbClr val="555555"/>
@@ -10391,14 +10569,14 @@
               <a:noFill/>
             </a:ln>
             <a:extLst>
-              <a:ext uri="{909E8E84-426E-40dd-AFC4-6F175D3DCCD1}">
+              <a:ext uri="{909E8E84-426E-40DD-AFC4-6F175D3DCCD1}">
                 <a14:hiddenFill xmlns:a14="http://schemas.microsoft.com/office/drawing/2010/main">
                   <a:solidFill>
                     <a:srgbClr val="FFFFFF"/>
                   </a:solidFill>
                 </a14:hiddenFill>
               </a:ext>
-              <a:ext uri="{91240B29-F687-4f45-9708-019B960494DF}">
+              <a:ext uri="{91240B29-F687-4F45-9708-019B960494DF}">
                 <a14:hiddenLine xmlns:a14="http://schemas.microsoft.com/office/drawing/2010/main" w="9525">
                   <a:solidFill>
                     <a:srgbClr val="555555"/>
@@ -10447,14 +10625,14 @@
               <a:noFill/>
             </a:ln>
             <a:extLst>
-              <a:ext uri="{909E8E84-426E-40dd-AFC4-6F175D3DCCD1}">
+              <a:ext uri="{909E8E84-426E-40DD-AFC4-6F175D3DCCD1}">
                 <a14:hiddenFill xmlns:a14="http://schemas.microsoft.com/office/drawing/2010/main">
                   <a:solidFill>
                     <a:srgbClr val="FFFFFF"/>
                   </a:solidFill>
                 </a14:hiddenFill>
               </a:ext>
-              <a:ext uri="{91240B29-F687-4f45-9708-019B960494DF}">
+              <a:ext uri="{91240B29-F687-4F45-9708-019B960494DF}">
                 <a14:hiddenLine xmlns:a14="http://schemas.microsoft.com/office/drawing/2010/main" w="9525">
                   <a:solidFill>
                     <a:srgbClr val="000000"/>
@@ -10610,14 +10788,14 @@
             <a:noFill/>
           </a:ln>
           <a:extLst>
-            <a:ext uri="{909E8E84-426E-40dd-AFC4-6F175D3DCCD1}">
+            <a:ext uri="{909E8E84-426E-40DD-AFC4-6F175D3DCCD1}">
               <a14:hiddenFill xmlns:a14="http://schemas.microsoft.com/office/drawing/2010/main">
                 <a:solidFill>
                   <a:srgbClr val="FFFFFF"/>
                 </a:solidFill>
               </a14:hiddenFill>
             </a:ext>
-            <a:ext uri="{91240B29-F687-4f45-9708-019B960494DF}">
+            <a:ext uri="{91240B29-F687-4F45-9708-019B960494DF}">
               <a14:hiddenLine xmlns:a14="http://schemas.microsoft.com/office/drawing/2010/main" w="9525">
                 <a:solidFill>
                   <a:srgbClr val="000000"/>
@@ -10658,14 +10836,14 @@
             <a:noFill/>
           </a:ln>
           <a:extLst>
-            <a:ext uri="{909E8E84-426E-40dd-AFC4-6F175D3DCCD1}">
+            <a:ext uri="{909E8E84-426E-40DD-AFC4-6F175D3DCCD1}">
               <a14:hiddenFill xmlns:a14="http://schemas.microsoft.com/office/drawing/2010/main">
                 <a:solidFill>
                   <a:srgbClr val="FFFFFF"/>
                 </a:solidFill>
               </a14:hiddenFill>
             </a:ext>
-            <a:ext uri="{91240B29-F687-4f45-9708-019B960494DF}">
+            <a:ext uri="{91240B29-F687-4F45-9708-019B960494DF}">
               <a14:hiddenLine xmlns:a14="http://schemas.microsoft.com/office/drawing/2010/main" w="9525">
                 <a:solidFill>
                   <a:srgbClr val="000000"/>
@@ -10706,14 +10884,14 @@
             <a:noFill/>
           </a:ln>
           <a:extLst>
-            <a:ext uri="{909E8E84-426E-40dd-AFC4-6F175D3DCCD1}">
+            <a:ext uri="{909E8E84-426E-40DD-AFC4-6F175D3DCCD1}">
               <a14:hiddenFill xmlns:a14="http://schemas.microsoft.com/office/drawing/2010/main">
                 <a:solidFill>
                   <a:srgbClr val="FFFFFF"/>
                 </a:solidFill>
               </a14:hiddenFill>
             </a:ext>
-            <a:ext uri="{91240B29-F687-4f45-9708-019B960494DF}">
+            <a:ext uri="{91240B29-F687-4F45-9708-019B960494DF}">
               <a14:hiddenLine xmlns:a14="http://schemas.microsoft.com/office/drawing/2010/main" w="9525">
                 <a:solidFill>
                   <a:srgbClr val="000000"/>
@@ -10754,14 +10932,14 @@
             <a:noFill/>
           </a:ln>
           <a:extLst>
-            <a:ext uri="{909E8E84-426E-40dd-AFC4-6F175D3DCCD1}">
+            <a:ext uri="{909E8E84-426E-40DD-AFC4-6F175D3DCCD1}">
               <a14:hiddenFill xmlns:a14="http://schemas.microsoft.com/office/drawing/2010/main">
                 <a:solidFill>
                   <a:srgbClr val="FFFFFF"/>
                 </a:solidFill>
               </a14:hiddenFill>
             </a:ext>
-            <a:ext uri="{91240B29-F687-4f45-9708-019B960494DF}">
+            <a:ext uri="{91240B29-F687-4F45-9708-019B960494DF}">
               <a14:hiddenLine xmlns:a14="http://schemas.microsoft.com/office/drawing/2010/main" w="9525">
                 <a:solidFill>
                   <a:srgbClr val="000000"/>
@@ -10789,7 +10967,7 @@
   <p:timing>
     <p:tnLst>
       <p:par>
-        <p:cTn xmlns:p14="http://schemas.microsoft.com/office/powerpoint/2010/main" id="1" dur="indefinite" restart="never" nodeType="tmRoot"/>
+        <p:cTn id="1" dur="indefinite" restart="never" nodeType="tmRoot"/>
       </p:par>
     </p:tnLst>
   </p:timing>
@@ -10852,7 +11030,7 @@
               <a:noFill/>
             </a:ln>
             <a:extLst>
-              <a:ext uri="{91240B29-F687-4f45-9708-019B960494DF}">
+              <a:ext uri="{91240B29-F687-4F45-9708-019B960494DF}">
                 <a14:hiddenLine xmlns:a14="http://schemas.microsoft.com/office/drawing/2010/main" w="9525">
                   <a:solidFill>
                     <a:srgbClr val="000000"/>
@@ -10911,7 +11089,7 @@
                 <a:noFill/>
               </a:ln>
               <a:extLst>
-                <a:ext uri="{91240B29-F687-4f45-9708-019B960494DF}">
+                <a:ext uri="{91240B29-F687-4F45-9708-019B960494DF}">
                   <a14:hiddenLine xmlns:a14="http://schemas.microsoft.com/office/drawing/2010/main" w="9525">
                     <a:solidFill>
                       <a:srgbClr val="7D7D7D"/>
@@ -11056,14 +11234,14 @@
                   <a:noFill/>
                 </a:ln>
                 <a:extLst>
-                  <a:ext uri="{909E8E84-426E-40dd-AFC4-6F175D3DCCD1}">
+                  <a:ext uri="{909E8E84-426E-40DD-AFC4-6F175D3DCCD1}">
                     <a14:hiddenFill xmlns:a14="http://schemas.microsoft.com/office/drawing/2010/main">
                       <a:solidFill>
                         <a:srgbClr val="FFFFFF"/>
                       </a:solidFill>
                     </a14:hiddenFill>
                   </a:ext>
-                  <a:ext uri="{91240B29-F687-4f45-9708-019B960494DF}">
+                  <a:ext uri="{91240B29-F687-4F45-9708-019B960494DF}">
                     <a14:hiddenLine xmlns:a14="http://schemas.microsoft.com/office/drawing/2010/main" w="9525">
                       <a:solidFill>
                         <a:srgbClr val="000000"/>
@@ -11257,7 +11435,7 @@
                 <a:noFill/>
               </a:ln>
               <a:extLst>
-                <a:ext uri="{91240B29-F687-4f45-9708-019B960494DF}">
+                <a:ext uri="{91240B29-F687-4F45-9708-019B960494DF}">
                   <a14:hiddenLine xmlns:a14="http://schemas.microsoft.com/office/drawing/2010/main" w="9525">
                     <a:solidFill>
                       <a:srgbClr val="7D7D7D"/>
@@ -11402,14 +11580,14 @@
                   <a:noFill/>
                 </a:ln>
                 <a:extLst>
-                  <a:ext uri="{909E8E84-426E-40dd-AFC4-6F175D3DCCD1}">
+                  <a:ext uri="{909E8E84-426E-40DD-AFC4-6F175D3DCCD1}">
                     <a14:hiddenFill xmlns:a14="http://schemas.microsoft.com/office/drawing/2010/main">
                       <a:solidFill>
                         <a:srgbClr val="FFFFFF"/>
                       </a:solidFill>
                     </a14:hiddenFill>
                   </a:ext>
-                  <a:ext uri="{91240B29-F687-4f45-9708-019B960494DF}">
+                  <a:ext uri="{91240B29-F687-4F45-9708-019B960494DF}">
                     <a14:hiddenLine xmlns:a14="http://schemas.microsoft.com/office/drawing/2010/main" w="9525">
                       <a:solidFill>
                         <a:srgbClr val="000000"/>
@@ -11793,7 +11971,7 @@
                 <a:noFill/>
               </a:ln>
               <a:extLst>
-                <a:ext uri="{91240B29-F687-4f45-9708-019B960494DF}">
+                <a:ext uri="{91240B29-F687-4F45-9708-019B960494DF}">
                   <a14:hiddenLine xmlns:a14="http://schemas.microsoft.com/office/drawing/2010/main" w="9525">
                     <a:solidFill>
                       <a:srgbClr val="7D7D7D"/>
@@ -11948,14 +12126,14 @@
                   <a:noFill/>
                 </a:ln>
                 <a:extLst>
-                  <a:ext uri="{909E8E84-426E-40dd-AFC4-6F175D3DCCD1}">
+                  <a:ext uri="{909E8E84-426E-40DD-AFC4-6F175D3DCCD1}">
                     <a14:hiddenFill xmlns:a14="http://schemas.microsoft.com/office/drawing/2010/main">
                       <a:solidFill>
                         <a:srgbClr val="FFFFFF"/>
                       </a:solidFill>
                     </a14:hiddenFill>
                   </a:ext>
-                  <a:ext uri="{91240B29-F687-4f45-9708-019B960494DF}">
+                  <a:ext uri="{91240B29-F687-4F45-9708-019B960494DF}">
                     <a14:hiddenLine xmlns:a14="http://schemas.microsoft.com/office/drawing/2010/main" w="9525">
                       <a:solidFill>
                         <a:srgbClr val="000000"/>
@@ -12131,7 +12309,7 @@
               <a:noFill/>
             </a:ln>
             <a:extLst>
-              <a:ext uri="{91240B29-F687-4f45-9708-019B960494DF}">
+              <a:ext uri="{91240B29-F687-4F45-9708-019B960494DF}">
                 <a14:hiddenLine xmlns:a14="http://schemas.microsoft.com/office/drawing/2010/main" w="9525">
                   <a:solidFill>
                     <a:srgbClr val="000000"/>
@@ -12190,7 +12368,7 @@
                 <a:noFill/>
               </a:ln>
               <a:extLst>
-                <a:ext uri="{91240B29-F687-4f45-9708-019B960494DF}">
+                <a:ext uri="{91240B29-F687-4F45-9708-019B960494DF}">
                   <a14:hiddenLine xmlns:a14="http://schemas.microsoft.com/office/drawing/2010/main" w="9525">
                     <a:solidFill>
                       <a:srgbClr val="7D7D7D"/>
@@ -12335,14 +12513,14 @@
                   <a:noFill/>
                 </a:ln>
                 <a:extLst>
-                  <a:ext uri="{909E8E84-426E-40dd-AFC4-6F175D3DCCD1}">
+                  <a:ext uri="{909E8E84-426E-40DD-AFC4-6F175D3DCCD1}">
                     <a14:hiddenFill xmlns:a14="http://schemas.microsoft.com/office/drawing/2010/main">
                       <a:solidFill>
                         <a:srgbClr val="FFFFFF"/>
                       </a:solidFill>
                     </a14:hiddenFill>
                   </a:ext>
-                  <a:ext uri="{91240B29-F687-4f45-9708-019B960494DF}">
+                  <a:ext uri="{91240B29-F687-4F45-9708-019B960494DF}">
                     <a14:hiddenLine xmlns:a14="http://schemas.microsoft.com/office/drawing/2010/main" w="9525">
                       <a:solidFill>
                         <a:srgbClr val="000000"/>
@@ -12516,7 +12694,7 @@
                 <a:noFill/>
               </a:ln>
               <a:extLst>
-                <a:ext uri="{91240B29-F687-4f45-9708-019B960494DF}">
+                <a:ext uri="{91240B29-F687-4F45-9708-019B960494DF}">
                   <a14:hiddenLine xmlns:a14="http://schemas.microsoft.com/office/drawing/2010/main" w="9525">
                     <a:solidFill>
                       <a:srgbClr val="7D7D7D"/>
@@ -12661,14 +12839,14 @@
                   <a:noFill/>
                 </a:ln>
                 <a:extLst>
-                  <a:ext uri="{909E8E84-426E-40dd-AFC4-6F175D3DCCD1}">
+                  <a:ext uri="{909E8E84-426E-40DD-AFC4-6F175D3DCCD1}">
                     <a14:hiddenFill xmlns:a14="http://schemas.microsoft.com/office/drawing/2010/main">
                       <a:solidFill>
                         <a:srgbClr val="FFFFFF"/>
                       </a:solidFill>
                     </a14:hiddenFill>
                   </a:ext>
-                  <a:ext uri="{91240B29-F687-4f45-9708-019B960494DF}">
+                  <a:ext uri="{91240B29-F687-4F45-9708-019B960494DF}">
                     <a14:hiddenLine xmlns:a14="http://schemas.microsoft.com/office/drawing/2010/main" w="9525">
                       <a:solidFill>
                         <a:srgbClr val="000000"/>
@@ -12912,7 +13090,7 @@
                 <a:noFill/>
               </a:ln>
               <a:extLst>
-                <a:ext uri="{91240B29-F687-4f45-9708-019B960494DF}">
+                <a:ext uri="{91240B29-F687-4F45-9708-019B960494DF}">
                   <a14:hiddenLine xmlns:a14="http://schemas.microsoft.com/office/drawing/2010/main" w="9525">
                     <a:solidFill>
                       <a:srgbClr val="7D7D7D"/>
@@ -13067,14 +13245,14 @@
                   <a:noFill/>
                 </a:ln>
                 <a:extLst>
-                  <a:ext uri="{909E8E84-426E-40dd-AFC4-6F175D3DCCD1}">
+                  <a:ext uri="{909E8E84-426E-40DD-AFC4-6F175D3DCCD1}">
                     <a14:hiddenFill xmlns:a14="http://schemas.microsoft.com/office/drawing/2010/main">
                       <a:solidFill>
                         <a:srgbClr val="FFFFFF"/>
                       </a:solidFill>
                     </a14:hiddenFill>
                   </a:ext>
-                  <a:ext uri="{91240B29-F687-4f45-9708-019B960494DF}">
+                  <a:ext uri="{91240B29-F687-4F45-9708-019B960494DF}">
                     <a14:hiddenLine xmlns:a14="http://schemas.microsoft.com/office/drawing/2010/main" w="9525">
                       <a:solidFill>
                         <a:srgbClr val="000000"/>
@@ -13232,14 +13410,14 @@
             <a:noFill/>
           </a:ln>
           <a:extLst>
-            <a:ext uri="{909E8E84-426E-40dd-AFC4-6F175D3DCCD1}">
+            <a:ext uri="{909E8E84-426E-40DD-AFC4-6F175D3DCCD1}">
               <a14:hiddenFill xmlns:a14="http://schemas.microsoft.com/office/drawing/2010/main">
                 <a:solidFill>
                   <a:srgbClr val="FFFFFF"/>
                 </a:solidFill>
               </a14:hiddenFill>
             </a:ext>
-            <a:ext uri="{91240B29-F687-4f45-9708-019B960494DF}">
+            <a:ext uri="{91240B29-F687-4F45-9708-019B960494DF}">
               <a14:hiddenLine xmlns:a14="http://schemas.microsoft.com/office/drawing/2010/main" w="9525">
                 <a:solidFill>
                   <a:srgbClr val="000000"/>
@@ -13298,7 +13476,7 @@
               <a:noFill/>
             </a:ln>
             <a:extLst>
-              <a:ext uri="{91240B29-F687-4f45-9708-019B960494DF}">
+              <a:ext uri="{91240B29-F687-4F45-9708-019B960494DF}">
                 <a14:hiddenLine xmlns:a14="http://schemas.microsoft.com/office/drawing/2010/main" w="9525">
                   <a:solidFill>
                     <a:srgbClr val="000000"/>
@@ -13357,7 +13535,7 @@
                 <a:noFill/>
               </a:ln>
               <a:extLst>
-                <a:ext uri="{91240B29-F687-4f45-9708-019B960494DF}">
+                <a:ext uri="{91240B29-F687-4F45-9708-019B960494DF}">
                   <a14:hiddenLine xmlns:a14="http://schemas.microsoft.com/office/drawing/2010/main" w="9525">
                     <a:solidFill>
                       <a:srgbClr val="7D7D7D"/>
@@ -13502,14 +13680,14 @@
                   <a:noFill/>
                 </a:ln>
                 <a:extLst>
-                  <a:ext uri="{909E8E84-426E-40dd-AFC4-6F175D3DCCD1}">
+                  <a:ext uri="{909E8E84-426E-40DD-AFC4-6F175D3DCCD1}">
                     <a14:hiddenFill xmlns:a14="http://schemas.microsoft.com/office/drawing/2010/main">
                       <a:solidFill>
                         <a:srgbClr val="FFFFFF"/>
                       </a:solidFill>
                     </a14:hiddenFill>
                   </a:ext>
-                  <a:ext uri="{91240B29-F687-4f45-9708-019B960494DF}">
+                  <a:ext uri="{91240B29-F687-4F45-9708-019B960494DF}">
                     <a14:hiddenLine xmlns:a14="http://schemas.microsoft.com/office/drawing/2010/main" w="9525">
                       <a:solidFill>
                         <a:srgbClr val="000000"/>
@@ -13703,7 +13881,7 @@
                 <a:noFill/>
               </a:ln>
               <a:extLst>
-                <a:ext uri="{91240B29-F687-4f45-9708-019B960494DF}">
+                <a:ext uri="{91240B29-F687-4F45-9708-019B960494DF}">
                   <a14:hiddenLine xmlns:a14="http://schemas.microsoft.com/office/drawing/2010/main" w="9525">
                     <a:solidFill>
                       <a:srgbClr val="7D7D7D"/>
@@ -13848,14 +14026,14 @@
                   <a:noFill/>
                 </a:ln>
                 <a:extLst>
-                  <a:ext uri="{909E8E84-426E-40dd-AFC4-6F175D3DCCD1}">
+                  <a:ext uri="{909E8E84-426E-40DD-AFC4-6F175D3DCCD1}">
                     <a14:hiddenFill xmlns:a14="http://schemas.microsoft.com/office/drawing/2010/main">
                       <a:solidFill>
                         <a:srgbClr val="FFFFFF"/>
                       </a:solidFill>
                     </a14:hiddenFill>
                   </a:ext>
-                  <a:ext uri="{91240B29-F687-4f45-9708-019B960494DF}">
+                  <a:ext uri="{91240B29-F687-4F45-9708-019B960494DF}">
                     <a14:hiddenLine xmlns:a14="http://schemas.microsoft.com/office/drawing/2010/main" w="9525">
                       <a:solidFill>
                         <a:srgbClr val="000000"/>
@@ -14149,7 +14327,7 @@
                 <a:noFill/>
               </a:ln>
               <a:extLst>
-                <a:ext uri="{91240B29-F687-4f45-9708-019B960494DF}">
+                <a:ext uri="{91240B29-F687-4F45-9708-019B960494DF}">
                   <a14:hiddenLine xmlns:a14="http://schemas.microsoft.com/office/drawing/2010/main" w="9525">
                     <a:solidFill>
                       <a:srgbClr val="7D7D7D"/>
@@ -14304,14 +14482,14 @@
                   <a:noFill/>
                 </a:ln>
                 <a:extLst>
-                  <a:ext uri="{909E8E84-426E-40dd-AFC4-6F175D3DCCD1}">
+                  <a:ext uri="{909E8E84-426E-40DD-AFC4-6F175D3DCCD1}">
                     <a14:hiddenFill xmlns:a14="http://schemas.microsoft.com/office/drawing/2010/main">
                       <a:solidFill>
                         <a:srgbClr val="FFFFFF"/>
                       </a:solidFill>
                     </a14:hiddenFill>
                   </a:ext>
-                  <a:ext uri="{91240B29-F687-4f45-9708-019B960494DF}">
+                  <a:ext uri="{91240B29-F687-4F45-9708-019B960494DF}">
                     <a14:hiddenLine xmlns:a14="http://schemas.microsoft.com/office/drawing/2010/main" w="9525">
                       <a:solidFill>
                         <a:srgbClr val="000000"/>
@@ -14514,7 +14692,7 @@
               <a:tailEnd type="none" w="sm" len="sm"/>
             </a:ln>
             <a:extLst>
-              <a:ext uri="{909E8E84-426E-40dd-AFC4-6F175D3DCCD1}">
+              <a:ext uri="{909E8E84-426E-40DD-AFC4-6F175D3DCCD1}">
                 <a14:hiddenFill xmlns:a14="http://schemas.microsoft.com/office/drawing/2010/main">
                   <a:solidFill>
                     <a:srgbClr val="FFFFFF"/>
@@ -14552,14 +14730,14 @@
               <a:noFill/>
             </a:ln>
             <a:extLst>
-              <a:ext uri="{909E8E84-426E-40dd-AFC4-6F175D3DCCD1}">
+              <a:ext uri="{909E8E84-426E-40DD-AFC4-6F175D3DCCD1}">
                 <a14:hiddenFill xmlns:a14="http://schemas.microsoft.com/office/drawing/2010/main">
                   <a:solidFill>
                     <a:srgbClr val="FFFFFF"/>
                   </a:solidFill>
                 </a14:hiddenFill>
               </a:ext>
-              <a:ext uri="{91240B29-F687-4f45-9708-019B960494DF}">
+              <a:ext uri="{91240B29-F687-4F45-9708-019B960494DF}">
                 <a14:hiddenLine xmlns:a14="http://schemas.microsoft.com/office/drawing/2010/main" w="9525">
                   <a:solidFill>
                     <a:srgbClr val="555555"/>
@@ -14608,14 +14786,14 @@
               <a:noFill/>
             </a:ln>
             <a:extLst>
-              <a:ext uri="{909E8E84-426E-40dd-AFC4-6F175D3DCCD1}">
+              <a:ext uri="{909E8E84-426E-40DD-AFC4-6F175D3DCCD1}">
                 <a14:hiddenFill xmlns:a14="http://schemas.microsoft.com/office/drawing/2010/main">
                   <a:solidFill>
                     <a:srgbClr val="FFFFFF"/>
                   </a:solidFill>
                 </a14:hiddenFill>
               </a:ext>
-              <a:ext uri="{91240B29-F687-4f45-9708-019B960494DF}">
+              <a:ext uri="{91240B29-F687-4F45-9708-019B960494DF}">
                 <a14:hiddenLine xmlns:a14="http://schemas.microsoft.com/office/drawing/2010/main" w="9525">
                   <a:solidFill>
                     <a:srgbClr val="555555"/>
@@ -14664,14 +14842,14 @@
               <a:noFill/>
             </a:ln>
             <a:extLst>
-              <a:ext uri="{909E8E84-426E-40dd-AFC4-6F175D3DCCD1}">
+              <a:ext uri="{909E8E84-426E-40DD-AFC4-6F175D3DCCD1}">
                 <a14:hiddenFill xmlns:a14="http://schemas.microsoft.com/office/drawing/2010/main">
                   <a:solidFill>
                     <a:srgbClr val="FFFFFF"/>
                   </a:solidFill>
                 </a14:hiddenFill>
               </a:ext>
-              <a:ext uri="{91240B29-F687-4f45-9708-019B960494DF}">
+              <a:ext uri="{91240B29-F687-4F45-9708-019B960494DF}">
                 <a14:hiddenLine xmlns:a14="http://schemas.microsoft.com/office/drawing/2010/main" w="9525">
                   <a:solidFill>
                     <a:srgbClr val="000000"/>
@@ -14872,7 +15050,7 @@
               <a:tailEnd type="none" w="sm" len="sm"/>
             </a:ln>
             <a:extLst>
-              <a:ext uri="{909E8E84-426E-40dd-AFC4-6F175D3DCCD1}">
+              <a:ext uri="{909E8E84-426E-40DD-AFC4-6F175D3DCCD1}">
                 <a14:hiddenFill xmlns:a14="http://schemas.microsoft.com/office/drawing/2010/main">
                   <a:solidFill>
                     <a:srgbClr val="FFFFFF"/>
@@ -14910,14 +15088,14 @@
               <a:noFill/>
             </a:ln>
             <a:extLst>
-              <a:ext uri="{909E8E84-426E-40dd-AFC4-6F175D3DCCD1}">
+              <a:ext uri="{909E8E84-426E-40DD-AFC4-6F175D3DCCD1}">
                 <a14:hiddenFill xmlns:a14="http://schemas.microsoft.com/office/drawing/2010/main">
                   <a:solidFill>
                     <a:srgbClr val="FFFFFF"/>
                   </a:solidFill>
                 </a14:hiddenFill>
               </a:ext>
-              <a:ext uri="{91240B29-F687-4f45-9708-019B960494DF}">
+              <a:ext uri="{91240B29-F687-4F45-9708-019B960494DF}">
                 <a14:hiddenLine xmlns:a14="http://schemas.microsoft.com/office/drawing/2010/main" w="9525">
                   <a:solidFill>
                     <a:srgbClr val="555555"/>
@@ -14966,14 +15144,14 @@
               <a:noFill/>
             </a:ln>
             <a:extLst>
-              <a:ext uri="{909E8E84-426E-40dd-AFC4-6F175D3DCCD1}">
+              <a:ext uri="{909E8E84-426E-40DD-AFC4-6F175D3DCCD1}">
                 <a14:hiddenFill xmlns:a14="http://schemas.microsoft.com/office/drawing/2010/main">
                   <a:solidFill>
                     <a:srgbClr val="FFFFFF"/>
                   </a:solidFill>
                 </a14:hiddenFill>
               </a:ext>
-              <a:ext uri="{91240B29-F687-4f45-9708-019B960494DF}">
+              <a:ext uri="{91240B29-F687-4F45-9708-019B960494DF}">
                 <a14:hiddenLine xmlns:a14="http://schemas.microsoft.com/office/drawing/2010/main" w="9525">
                   <a:solidFill>
                     <a:srgbClr val="555555"/>
@@ -15022,14 +15200,14 @@
               <a:noFill/>
             </a:ln>
             <a:extLst>
-              <a:ext uri="{909E8E84-426E-40dd-AFC4-6F175D3DCCD1}">
+              <a:ext uri="{909E8E84-426E-40DD-AFC4-6F175D3DCCD1}">
                 <a14:hiddenFill xmlns:a14="http://schemas.microsoft.com/office/drawing/2010/main">
                   <a:solidFill>
                     <a:srgbClr val="FFFFFF"/>
                   </a:solidFill>
                 </a14:hiddenFill>
               </a:ext>
-              <a:ext uri="{91240B29-F687-4f45-9708-019B960494DF}">
+              <a:ext uri="{91240B29-F687-4F45-9708-019B960494DF}">
                 <a14:hiddenLine xmlns:a14="http://schemas.microsoft.com/office/drawing/2010/main" w="9525">
                   <a:solidFill>
                     <a:srgbClr val="000000"/>
@@ -15172,10 +15350,167 @@
   <p:timing>
     <p:tnLst>
       <p:par>
-        <p:cTn xmlns:p14="http://schemas.microsoft.com/office/powerpoint/2010/main" id="1" dur="indefinite" restart="never" nodeType="tmRoot"/>
+        <p:cTn id="1" dur="indefinite" restart="never" nodeType="tmRoot"/>
       </p:par>
     </p:tnLst>
   </p:timing>
+</p:sld>
+</file>
+
+<file path=ppt/slides/slide6.xml><?xml version="1.0" encoding="utf-8"?>
+<p:sld xmlns:a="http://schemas.openxmlformats.org/drawingml/2006/main" xmlns:r="http://schemas.openxmlformats.org/officeDocument/2006/relationships" xmlns:p="http://schemas.openxmlformats.org/presentationml/2006/main">
+  <p:cSld>
+    <p:spTree>
+      <p:nvGrpSpPr>
+        <p:cNvPr id="1" name=""/>
+        <p:cNvGrpSpPr/>
+        <p:nvPr/>
+      </p:nvGrpSpPr>
+      <p:grpSpPr>
+        <a:xfrm>
+          <a:off x="0" y="0"/>
+          <a:ext cx="0" cy="0"/>
+          <a:chOff x="0" y="0"/>
+          <a:chExt cx="0" cy="0"/>
+        </a:xfrm>
+      </p:grpSpPr>
+      <p:sp>
+        <p:nvSpPr>
+          <p:cNvPr id="2" name="Rectangle 2"/>
+          <p:cNvSpPr>
+            <a:spLocks noChangeArrowheads="1"/>
+          </p:cNvSpPr>
+          <p:nvPr/>
+        </p:nvSpPr>
+        <p:spPr bwMode="auto">
+          <a:xfrm>
+            <a:off x="0" y="0"/>
+            <a:ext cx="7770813" cy="0"/>
+          </a:xfrm>
+          <a:prstGeom prst="rect">
+            <a:avLst/>
+          </a:prstGeom>
+          <a:noFill/>
+          <a:ln>
+            <a:noFill/>
+          </a:ln>
+          <a:effectLst/>
+          <a:extLst>
+            <a:ext uri="{909E8E84-426E-40DD-AFC4-6F175D3DCCD1}">
+              <a14:hiddenFill xmlns:a14="http://schemas.microsoft.com/office/drawing/2010/main">
+                <a:solidFill>
+                  <a:schemeClr val="accent1"/>
+                </a:solidFill>
+              </a14:hiddenFill>
+            </a:ext>
+            <a:ext uri="{91240B29-F687-4F45-9708-019B960494DF}">
+              <a14:hiddenLine xmlns:a14="http://schemas.microsoft.com/office/drawing/2010/main" w="9525">
+                <a:solidFill>
+                  <a:schemeClr val="tx1"/>
+                </a:solidFill>
+                <a:miter lim="800000"/>
+                <a:headEnd/>
+                <a:tailEnd/>
+              </a14:hiddenLine>
+            </a:ext>
+            <a:ext uri="{AF507438-7753-43E0-B8FC-AC1667EBCBE1}">
+              <a14:hiddenEffects xmlns:a14="http://schemas.microsoft.com/office/drawing/2010/main">
+                <a:effectLst>
+                  <a:outerShdw dist="35921" dir="2700000" algn="ctr" rotWithShape="0">
+                    <a:schemeClr val="bg2"/>
+                  </a:outerShdw>
+                </a:effectLst>
+              </a14:hiddenEffects>
+            </a:ext>
+          </a:extLst>
+        </p:spPr>
+        <p:txBody>
+          <a:bodyPr vert="horz" wrap="none" lIns="91440" tIns="45720" rIns="91440" bIns="45720" numCol="1" anchor="ctr" anchorCtr="0" compatLnSpc="1">
+            <a:prstTxWarp prst="textNoShape">
+              <a:avLst/>
+            </a:prstTxWarp>
+            <a:spAutoFit/>
+          </a:bodyPr>
+          <a:lstStyle/>
+          <a:p>
+            <a:endParaRPr lang="en-US"/>
+          </a:p>
+        </p:txBody>
+      </p:sp>
+      <p:pic>
+        <p:nvPicPr>
+          <p:cNvPr id="1027" name="Picture 3"/>
+          <p:cNvPicPr>
+            <a:picLocks noChangeAspect="1" noChangeArrowheads="1"/>
+          </p:cNvPicPr>
+          <p:nvPr/>
+        </p:nvPicPr>
+        <p:blipFill>
+          <a:blip r:embed="rId2">
+            <a:extLst>
+              <a:ext uri="{28A0092B-C50C-407E-A947-70E740481C1C}">
+                <a14:useLocalDpi xmlns:a14="http://schemas.microsoft.com/office/drawing/2010/main" val="0"/>
+              </a:ext>
+            </a:extLst>
+          </a:blip>
+          <a:srcRect/>
+          <a:stretch>
+            <a:fillRect/>
+          </a:stretch>
+        </p:blipFill>
+        <p:spPr bwMode="auto">
+          <a:xfrm>
+            <a:off x="424218" y="151606"/>
+            <a:ext cx="7042588" cy="9771787"/>
+          </a:xfrm>
+          <a:prstGeom prst="rect">
+            <a:avLst/>
+          </a:prstGeom>
+          <a:noFill/>
+          <a:ln>
+            <a:noFill/>
+          </a:ln>
+          <a:effectLst/>
+          <a:extLst>
+            <a:ext uri="{909E8E84-426E-40DD-AFC4-6F175D3DCCD1}">
+              <a14:hiddenFill xmlns:a14="http://schemas.microsoft.com/office/drawing/2010/main">
+                <a:solidFill>
+                  <a:schemeClr val="accent1"/>
+                </a:solidFill>
+              </a14:hiddenFill>
+            </a:ext>
+            <a:ext uri="{91240B29-F687-4F45-9708-019B960494DF}">
+              <a14:hiddenLine xmlns:a14="http://schemas.microsoft.com/office/drawing/2010/main" w="9525">
+                <a:solidFill>
+                  <a:schemeClr val="tx1"/>
+                </a:solidFill>
+                <a:miter lim="800000"/>
+                <a:headEnd/>
+                <a:tailEnd/>
+              </a14:hiddenLine>
+            </a:ext>
+            <a:ext uri="{AF507438-7753-43E0-B8FC-AC1667EBCBE1}">
+              <a14:hiddenEffects xmlns:a14="http://schemas.microsoft.com/office/drawing/2010/main">
+                <a:effectLst>
+                  <a:outerShdw dist="35921" dir="2700000" algn="ctr" rotWithShape="0">
+                    <a:schemeClr val="bg2"/>
+                  </a:outerShdw>
+                </a:effectLst>
+              </a14:hiddenEffects>
+            </a:ext>
+          </a:extLst>
+        </p:spPr>
+      </p:pic>
+    </p:spTree>
+    <p:extLst>
+      <p:ext uri="{BB962C8B-B14F-4D97-AF65-F5344CB8AC3E}">
+        <p14:creationId xmlns:p14="http://schemas.microsoft.com/office/powerpoint/2010/main" val="3859289385"/>
+      </p:ext>
+    </p:extLst>
+  </p:cSld>
+  <p:clrMapOvr>
+    <a:masterClrMapping/>
+  </p:clrMapOvr>
 </p:sld>
 </file>
 
@@ -15424,7 +15759,7 @@
         </a:ln>
         <a:effectLst/>
         <a:extLst>
-          <a:ext uri="{AF507438-7753-43e0-B8FC-AC1667EBCBE1}">
+          <a:ext uri="{AF507438-7753-43E0-B8FC-AC1667EBCBE1}">
             <a14:hiddenEffects xmlns:a14="http://schemas.microsoft.com/office/drawing/2010/main">
               <a:effectLst>
                 <a:outerShdw blurRad="63500" dist="38099" dir="2700000" algn="ctr" rotWithShape="0">
@@ -15500,7 +15835,7 @@
         </a:ln>
         <a:effectLst/>
         <a:extLst>
-          <a:ext uri="{AF507438-7753-43e0-B8FC-AC1667EBCBE1}">
+          <a:ext uri="{AF507438-7753-43E0-B8FC-AC1667EBCBE1}">
             <a14:hiddenEffects xmlns:a14="http://schemas.microsoft.com/office/drawing/2010/main">
               <a:effectLst>
                 <a:outerShdw blurRad="63500" dist="38099" dir="2700000" algn="ctr" rotWithShape="0">

</xml_diff>